<commit_message>
updated report and simulations
</commit_message>
<xml_diff>
--- a/docs/word_report/graphics.pptx
+++ b/docs/word_report/graphics.pptx
@@ -3345,10 +3345,10 @@
       </p:grpSpPr>
       <p:grpSp>
         <p:nvGrpSpPr>
-          <p:cNvPr id="127" name="Group 126">
-            <a:extLst>
-              <a:ext uri="{FF2B5EF4-FFF2-40B4-BE49-F238E27FC236}">
-                <a16:creationId xmlns:a16="http://schemas.microsoft.com/office/drawing/2014/main" id="{940DAB75-02E0-4651-8460-B680EDF190A5}"/>
+          <p:cNvPr id="133" name="Group 132">
+            <a:extLst>
+              <a:ext uri="{FF2B5EF4-FFF2-40B4-BE49-F238E27FC236}">
+                <a16:creationId xmlns:a16="http://schemas.microsoft.com/office/drawing/2014/main" id="{8471EC97-DC9C-40F7-8F2E-45B8284F8338}"/>
               </a:ext>
             </a:extLst>
           </p:cNvPr>
@@ -3357,10 +3357,10 @@
         </p:nvGrpSpPr>
         <p:grpSpPr>
           <a:xfrm>
-            <a:off x="3677920" y="230474"/>
-            <a:ext cx="5364479" cy="6261766"/>
-            <a:chOff x="3677920" y="230474"/>
-            <a:chExt cx="5364479" cy="6261766"/>
+            <a:off x="3159760" y="0"/>
+            <a:ext cx="8128000" cy="6776720"/>
+            <a:chOff x="3159760" y="0"/>
+            <a:chExt cx="8128000" cy="6776720"/>
           </a:xfrm>
         </p:grpSpPr>
         <p:sp>
@@ -3377,8 +3377,8 @@
           </p:nvSpPr>
           <p:spPr>
             <a:xfrm>
-              <a:off x="3677920" y="230474"/>
-              <a:ext cx="5364479" cy="6261766"/>
+              <a:off x="3159760" y="0"/>
+              <a:ext cx="8128000" cy="6776720"/>
             </a:xfrm>
             <a:prstGeom prst="rect">
               <a:avLst/>
@@ -3429,7 +3429,7 @@
           </p:nvGrpSpPr>
           <p:grpSpPr>
             <a:xfrm>
-              <a:off x="3821807" y="4171978"/>
+              <a:off x="7391517" y="4443830"/>
               <a:ext cx="3680637" cy="2308324"/>
               <a:chOff x="8722658" y="2322076"/>
               <a:chExt cx="3525416" cy="2308324"/>
@@ -3589,13 +3589,8 @@
                   <a:p>
                     <a:r>
                       <a:rPr lang="en-US" dirty="0"/>
-                      <a:t>Dependent on </a:t>
+                      <a:t>Dependent on selected first skips</a:t>
                     </a:r>
-                    <a:r>
-                      <a:rPr lang="en-US"/>
-                      <a:t>selected first skips</a:t>
-                    </a:r>
-                    <a:endParaRPr lang="en-US" dirty="0"/>
                   </a:p>
                   <a:p>
                     <a:r>
@@ -3909,1603 +3904,48 @@
             </p:style>
           </p:cxnSp>
         </p:grpSp>
-        <p:grpSp>
-          <p:nvGrpSpPr>
-            <p:cNvPr id="122" name="Group 121">
+        <p:pic>
+          <p:nvPicPr>
+            <p:cNvPr id="131" name="Picture 130" descr="Shape&#10;&#10;Description automatically generated">
               <a:extLst>
                 <a:ext uri="{FF2B5EF4-FFF2-40B4-BE49-F238E27FC236}">
-                  <a16:creationId xmlns:a16="http://schemas.microsoft.com/office/drawing/2014/main" id="{9F1156E4-486E-45A6-A98F-A86D02220719}"/>
+                  <a16:creationId xmlns:a16="http://schemas.microsoft.com/office/drawing/2014/main" id="{E0729B86-B28F-403B-A81C-DBCA38E7FC12}"/>
                 </a:ext>
               </a:extLst>
             </p:cNvPr>
-            <p:cNvGrpSpPr/>
+            <p:cNvPicPr>
+              <a:picLocks noChangeAspect="1"/>
+            </p:cNvPicPr>
             <p:nvPr/>
-          </p:nvGrpSpPr>
-          <p:grpSpPr>
+          </p:nvPicPr>
+          <p:blipFill>
+            <a:blip r:embed="rId4">
+              <a:extLst>
+                <a:ext uri="{28A0092B-C50C-407E-A947-70E740481C1C}">
+                  <a14:useLocalDpi xmlns:a14="http://schemas.microsoft.com/office/drawing/2010/main" val="0"/>
+                </a:ext>
+              </a:extLst>
+            </a:blip>
+            <a:stretch>
+              <a:fillRect/>
+            </a:stretch>
+          </p:blipFill>
+          <p:spPr>
             <a:xfrm>
-              <a:off x="4133328" y="289410"/>
-              <a:ext cx="4670610" cy="3729460"/>
-              <a:chOff x="2832848" y="1595718"/>
-              <a:chExt cx="4670610" cy="3729460"/>
+              <a:off x="3350554" y="187253"/>
+              <a:ext cx="6504646" cy="5258339"/>
             </a:xfrm>
-          </p:grpSpPr>
-          <p:sp>
-            <p:nvSpPr>
-              <p:cNvPr id="7" name="Rectangle 6">
-                <a:extLst>
-                  <a:ext uri="{FF2B5EF4-FFF2-40B4-BE49-F238E27FC236}">
-                    <a16:creationId xmlns:a16="http://schemas.microsoft.com/office/drawing/2014/main" id="{8879A3E2-8595-4B2D-BF13-B29FCB96E3B8}"/>
-                  </a:ext>
-                </a:extLst>
-              </p:cNvPr>
-              <p:cNvSpPr/>
-              <p:nvPr/>
-            </p:nvSpPr>
-            <p:spPr>
-              <a:xfrm>
-                <a:off x="2832848" y="5038164"/>
-                <a:ext cx="143435" cy="144000"/>
-              </a:xfrm>
-              <a:prstGeom prst="rect">
-                <a:avLst/>
-              </a:prstGeom>
-            </p:spPr>
-            <p:style>
-              <a:lnRef idx="2">
-                <a:schemeClr val="dk1">
-                  <a:shade val="50000"/>
-                </a:schemeClr>
-              </a:lnRef>
-              <a:fillRef idx="1">
-                <a:schemeClr val="dk1"/>
-              </a:fillRef>
-              <a:effectRef idx="0">
-                <a:schemeClr val="dk1"/>
-              </a:effectRef>
-              <a:fontRef idx="minor">
-                <a:schemeClr val="lt1"/>
-              </a:fontRef>
-            </p:style>
-            <p:txBody>
-              <a:bodyPr rtlCol="0" anchor="ctr"/>
-              <a:lstStyle/>
-              <a:p>
-                <a:pPr algn="ctr"/>
-                <a:endParaRPr lang="en-CH"/>
-              </a:p>
-            </p:txBody>
-          </p:sp>
-          <p:sp>
-            <p:nvSpPr>
-              <p:cNvPr id="8" name="Oval 7">
-                <a:extLst>
-                  <a:ext uri="{FF2B5EF4-FFF2-40B4-BE49-F238E27FC236}">
-                    <a16:creationId xmlns:a16="http://schemas.microsoft.com/office/drawing/2014/main" id="{E181D770-471C-4B08-B7E1-7B537E46AB1F}"/>
-                  </a:ext>
-                </a:extLst>
-              </p:cNvPr>
-              <p:cNvSpPr/>
-              <p:nvPr/>
-            </p:nvSpPr>
-            <p:spPr>
-              <a:xfrm>
-                <a:off x="6391835" y="2814917"/>
-                <a:ext cx="288000" cy="288000"/>
-              </a:xfrm>
-              <a:prstGeom prst="ellipse">
-                <a:avLst/>
-              </a:prstGeom>
-              <a:ln w="38100"/>
-            </p:spPr>
-            <p:style>
-              <a:lnRef idx="2">
-                <a:schemeClr val="dk1"/>
-              </a:lnRef>
-              <a:fillRef idx="1">
-                <a:schemeClr val="lt1"/>
-              </a:fillRef>
-              <a:effectRef idx="0">
-                <a:schemeClr val="dk1"/>
-              </a:effectRef>
-              <a:fontRef idx="minor">
-                <a:schemeClr val="dk1"/>
-              </a:fontRef>
-            </p:style>
-            <p:txBody>
-              <a:bodyPr rtlCol="0" anchor="ctr"/>
-              <a:lstStyle/>
-              <a:p>
-                <a:pPr algn="ctr"/>
-                <a:endParaRPr lang="en-CH"/>
-              </a:p>
-            </p:txBody>
-          </p:sp>
-          <p:sp>
-            <p:nvSpPr>
-              <p:cNvPr id="9" name="Oval 8">
-                <a:extLst>
-                  <a:ext uri="{FF2B5EF4-FFF2-40B4-BE49-F238E27FC236}">
-                    <a16:creationId xmlns:a16="http://schemas.microsoft.com/office/drawing/2014/main" id="{864F1E99-456E-4031-9DE6-B45550556E3E}"/>
-                  </a:ext>
-                </a:extLst>
-              </p:cNvPr>
-              <p:cNvSpPr/>
-              <p:nvPr/>
-            </p:nvSpPr>
-            <p:spPr>
-              <a:xfrm>
-                <a:off x="3163835" y="2375647"/>
-                <a:ext cx="180000" cy="180000"/>
-              </a:xfrm>
-              <a:prstGeom prst="ellipse">
-                <a:avLst/>
-              </a:prstGeom>
-              <a:solidFill>
-                <a:srgbClr val="C00000"/>
-              </a:solidFill>
-              <a:ln>
-                <a:solidFill>
-                  <a:srgbClr val="C00000"/>
-                </a:solidFill>
-              </a:ln>
-            </p:spPr>
-            <p:style>
-              <a:lnRef idx="2">
-                <a:schemeClr val="accent1">
-                  <a:shade val="50000"/>
-                </a:schemeClr>
-              </a:lnRef>
-              <a:fillRef idx="1">
-                <a:schemeClr val="accent1"/>
-              </a:fillRef>
-              <a:effectRef idx="0">
-                <a:schemeClr val="accent1"/>
-              </a:effectRef>
-              <a:fontRef idx="minor">
-                <a:schemeClr val="lt1"/>
-              </a:fontRef>
-            </p:style>
-            <p:txBody>
-              <a:bodyPr rtlCol="0" anchor="ctr"/>
-              <a:lstStyle/>
-              <a:p>
-                <a:pPr algn="ctr"/>
-                <a:endParaRPr lang="en-CH"/>
-              </a:p>
-            </p:txBody>
-          </p:sp>
-          <p:sp>
-            <p:nvSpPr>
-              <p:cNvPr id="11" name="Oval 10">
-                <a:extLst>
-                  <a:ext uri="{FF2B5EF4-FFF2-40B4-BE49-F238E27FC236}">
-                    <a16:creationId xmlns:a16="http://schemas.microsoft.com/office/drawing/2014/main" id="{9109B714-4AD4-4B87-817A-352482A58CAA}"/>
-                  </a:ext>
-                </a:extLst>
-              </p:cNvPr>
-              <p:cNvSpPr/>
-              <p:nvPr/>
-            </p:nvSpPr>
-            <p:spPr>
-              <a:xfrm>
-                <a:off x="5278800" y="1595718"/>
-                <a:ext cx="180000" cy="180000"/>
-              </a:xfrm>
-              <a:prstGeom prst="ellipse">
-                <a:avLst/>
-              </a:prstGeom>
-              <a:solidFill>
-                <a:srgbClr val="C00000"/>
-              </a:solidFill>
-              <a:ln>
-                <a:solidFill>
-                  <a:srgbClr val="C00000"/>
-                </a:solidFill>
-              </a:ln>
-            </p:spPr>
-            <p:style>
-              <a:lnRef idx="2">
-                <a:schemeClr val="accent1">
-                  <a:shade val="50000"/>
-                </a:schemeClr>
-              </a:lnRef>
-              <a:fillRef idx="1">
-                <a:schemeClr val="accent1"/>
-              </a:fillRef>
-              <a:effectRef idx="0">
-                <a:schemeClr val="accent1"/>
-              </a:effectRef>
-              <a:fontRef idx="minor">
-                <a:schemeClr val="lt1"/>
-              </a:fontRef>
-            </p:style>
-            <p:txBody>
-              <a:bodyPr rtlCol="0" anchor="ctr"/>
-              <a:lstStyle/>
-              <a:p>
-                <a:pPr algn="ctr"/>
-                <a:endParaRPr lang="en-CH"/>
-              </a:p>
-            </p:txBody>
-          </p:sp>
-          <p:sp>
-            <p:nvSpPr>
-              <p:cNvPr id="12" name="Oval 11">
-                <a:extLst>
-                  <a:ext uri="{FF2B5EF4-FFF2-40B4-BE49-F238E27FC236}">
-                    <a16:creationId xmlns:a16="http://schemas.microsoft.com/office/drawing/2014/main" id="{09105963-E577-4653-A895-52FDA1E01B5D}"/>
-                  </a:ext>
-                </a:extLst>
-              </p:cNvPr>
-              <p:cNvSpPr/>
-              <p:nvPr/>
-            </p:nvSpPr>
-            <p:spPr>
-              <a:xfrm>
-                <a:off x="7323458" y="3464153"/>
-                <a:ext cx="180000" cy="180000"/>
-              </a:xfrm>
-              <a:prstGeom prst="ellipse">
-                <a:avLst/>
-              </a:prstGeom>
-              <a:solidFill>
-                <a:srgbClr val="C00000"/>
-              </a:solidFill>
-              <a:ln>
-                <a:solidFill>
-                  <a:srgbClr val="C00000"/>
-                </a:solidFill>
-              </a:ln>
-            </p:spPr>
-            <p:style>
-              <a:lnRef idx="2">
-                <a:schemeClr val="accent1">
-                  <a:shade val="50000"/>
-                </a:schemeClr>
-              </a:lnRef>
-              <a:fillRef idx="1">
-                <a:schemeClr val="accent1"/>
-              </a:fillRef>
-              <a:effectRef idx="0">
-                <a:schemeClr val="accent1"/>
-              </a:effectRef>
-              <a:fontRef idx="minor">
-                <a:schemeClr val="lt1"/>
-              </a:fontRef>
-            </p:style>
-            <p:txBody>
-              <a:bodyPr rtlCol="0" anchor="ctr"/>
-              <a:lstStyle/>
-              <a:p>
-                <a:pPr algn="ctr"/>
-                <a:endParaRPr lang="en-CH"/>
-              </a:p>
-            </p:txBody>
-          </p:sp>
-          <p:sp>
-            <p:nvSpPr>
-              <p:cNvPr id="13" name="Oval 12">
-                <a:extLst>
-                  <a:ext uri="{FF2B5EF4-FFF2-40B4-BE49-F238E27FC236}">
-                    <a16:creationId xmlns:a16="http://schemas.microsoft.com/office/drawing/2014/main" id="{B75DB29F-7969-4844-999A-5149F399EA89}"/>
-                  </a:ext>
-                </a:extLst>
-              </p:cNvPr>
-              <p:cNvSpPr/>
-              <p:nvPr/>
-            </p:nvSpPr>
-            <p:spPr>
-              <a:xfrm>
-                <a:off x="3424052" y="3638246"/>
-                <a:ext cx="180000" cy="180000"/>
-              </a:xfrm>
-              <a:prstGeom prst="ellipse">
-                <a:avLst/>
-              </a:prstGeom>
-              <a:solidFill>
-                <a:srgbClr val="C00000"/>
-              </a:solidFill>
-              <a:ln>
-                <a:solidFill>
-                  <a:srgbClr val="C00000"/>
-                </a:solidFill>
-              </a:ln>
-            </p:spPr>
-            <p:style>
-              <a:lnRef idx="2">
-                <a:schemeClr val="accent1">
-                  <a:shade val="50000"/>
-                </a:schemeClr>
-              </a:lnRef>
-              <a:fillRef idx="1">
-                <a:schemeClr val="accent1"/>
-              </a:fillRef>
-              <a:effectRef idx="0">
-                <a:schemeClr val="accent1"/>
-              </a:effectRef>
-              <a:fontRef idx="minor">
-                <a:schemeClr val="lt1"/>
-              </a:fontRef>
-            </p:style>
-            <p:txBody>
-              <a:bodyPr rtlCol="0" anchor="ctr"/>
-              <a:lstStyle/>
-              <a:p>
-                <a:pPr algn="ctr"/>
-                <a:endParaRPr lang="en-CH"/>
-              </a:p>
-            </p:txBody>
-          </p:sp>
-          <p:cxnSp>
-            <p:nvCxnSpPr>
-              <p:cNvPr id="15" name="Straight Arrow Connector 14">
-                <a:extLst>
-                  <a:ext uri="{FF2B5EF4-FFF2-40B4-BE49-F238E27FC236}">
-                    <a16:creationId xmlns:a16="http://schemas.microsoft.com/office/drawing/2014/main" id="{C44B9C91-FC53-4ABD-9B43-BCC4293E3470}"/>
-                  </a:ext>
-                </a:extLst>
-              </p:cNvPr>
-              <p:cNvCxnSpPr>
-                <a:cxnSpLocks/>
-                <a:stCxn id="7" idx="0"/>
-                <a:endCxn id="13" idx="3"/>
-              </p:cNvCxnSpPr>
-              <p:nvPr/>
-            </p:nvCxnSpPr>
-            <p:spPr>
-              <a:xfrm flipV="1">
-                <a:off x="2904566" y="3791886"/>
-                <a:ext cx="545846" cy="1246278"/>
-              </a:xfrm>
-              <a:prstGeom prst="straightConnector1">
-                <a:avLst/>
-              </a:prstGeom>
-              <a:ln w="19050">
-                <a:prstDash val="sysDot"/>
-                <a:tailEnd type="triangle"/>
-              </a:ln>
-            </p:spPr>
-            <p:style>
-              <a:lnRef idx="1">
-                <a:schemeClr val="accent1"/>
-              </a:lnRef>
-              <a:fillRef idx="0">
-                <a:schemeClr val="accent1"/>
-              </a:fillRef>
-              <a:effectRef idx="0">
-                <a:schemeClr val="accent1"/>
-              </a:effectRef>
-              <a:fontRef idx="minor">
-                <a:schemeClr val="tx1"/>
-              </a:fontRef>
-            </p:style>
-          </p:cxnSp>
-          <p:cxnSp>
-            <p:nvCxnSpPr>
-              <p:cNvPr id="17" name="Straight Arrow Connector 16">
-                <a:extLst>
-                  <a:ext uri="{FF2B5EF4-FFF2-40B4-BE49-F238E27FC236}">
-                    <a16:creationId xmlns:a16="http://schemas.microsoft.com/office/drawing/2014/main" id="{5C87F79D-5DDF-4CE1-BE18-724E228D39FD}"/>
-                  </a:ext>
-                </a:extLst>
-              </p:cNvPr>
-              <p:cNvCxnSpPr>
-                <a:cxnSpLocks/>
-                <a:stCxn id="13" idx="7"/>
-                <a:endCxn id="8" idx="2"/>
-              </p:cNvCxnSpPr>
-              <p:nvPr/>
-            </p:nvCxnSpPr>
-            <p:spPr>
-              <a:xfrm flipV="1">
-                <a:off x="3577692" y="2958917"/>
-                <a:ext cx="2814143" cy="705689"/>
-              </a:xfrm>
-              <a:prstGeom prst="straightConnector1">
-                <a:avLst/>
-              </a:prstGeom>
-              <a:ln w="19050">
-                <a:prstDash val="sysDot"/>
-                <a:tailEnd type="triangle"/>
-              </a:ln>
-            </p:spPr>
-            <p:style>
-              <a:lnRef idx="1">
-                <a:schemeClr val="accent1"/>
-              </a:lnRef>
-              <a:fillRef idx="0">
-                <a:schemeClr val="accent1"/>
-              </a:fillRef>
-              <a:effectRef idx="0">
-                <a:schemeClr val="accent1"/>
-              </a:effectRef>
-              <a:fontRef idx="minor">
-                <a:schemeClr val="tx1"/>
-              </a:fontRef>
-            </p:style>
-          </p:cxnSp>
-          <p:cxnSp>
-            <p:nvCxnSpPr>
-              <p:cNvPr id="19" name="Straight Arrow Connector 18">
-                <a:extLst>
-                  <a:ext uri="{FF2B5EF4-FFF2-40B4-BE49-F238E27FC236}">
-                    <a16:creationId xmlns:a16="http://schemas.microsoft.com/office/drawing/2014/main" id="{99B53A00-1628-45BB-9415-ADB713F00E04}"/>
-                  </a:ext>
-                </a:extLst>
-              </p:cNvPr>
-              <p:cNvCxnSpPr>
-                <a:stCxn id="8" idx="1"/>
-                <a:endCxn id="9" idx="4"/>
-              </p:cNvCxnSpPr>
-              <p:nvPr/>
-            </p:nvCxnSpPr>
-            <p:spPr>
-              <a:xfrm flipH="1" flipV="1">
-                <a:off x="3253835" y="2555647"/>
-                <a:ext cx="3180177" cy="301447"/>
-              </a:xfrm>
-              <a:prstGeom prst="straightConnector1">
-                <a:avLst/>
-              </a:prstGeom>
-              <a:ln w="12700">
-                <a:solidFill>
-                  <a:schemeClr val="accent6"/>
-                </a:solidFill>
-                <a:prstDash val="lgDash"/>
-                <a:tailEnd type="triangle"/>
-              </a:ln>
-            </p:spPr>
-            <p:style>
-              <a:lnRef idx="1">
-                <a:schemeClr val="accent1"/>
-              </a:lnRef>
-              <a:fillRef idx="0">
-                <a:schemeClr val="accent1"/>
-              </a:fillRef>
-              <a:effectRef idx="0">
-                <a:schemeClr val="accent1"/>
-              </a:effectRef>
-              <a:fontRef idx="minor">
-                <a:schemeClr val="tx1"/>
-              </a:fontRef>
-            </p:style>
-          </p:cxnSp>
-          <p:cxnSp>
-            <p:nvCxnSpPr>
-              <p:cNvPr id="21" name="Straight Arrow Connector 20">
-                <a:extLst>
-                  <a:ext uri="{FF2B5EF4-FFF2-40B4-BE49-F238E27FC236}">
-                    <a16:creationId xmlns:a16="http://schemas.microsoft.com/office/drawing/2014/main" id="{F8CC99F4-10EB-4820-B637-E8A933180B25}"/>
-                  </a:ext>
-                </a:extLst>
-              </p:cNvPr>
-              <p:cNvCxnSpPr>
-                <a:stCxn id="9" idx="6"/>
-                <a:endCxn id="8" idx="0"/>
-              </p:cNvCxnSpPr>
-              <p:nvPr/>
-            </p:nvCxnSpPr>
-            <p:spPr>
-              <a:xfrm>
-                <a:off x="3343835" y="2465647"/>
-                <a:ext cx="3192000" cy="349270"/>
-              </a:xfrm>
-              <a:prstGeom prst="straightConnector1">
-                <a:avLst/>
-              </a:prstGeom>
-              <a:ln w="12700">
-                <a:solidFill>
-                  <a:schemeClr val="accent6"/>
-                </a:solidFill>
-                <a:prstDash val="lgDash"/>
-                <a:tailEnd type="triangle"/>
-              </a:ln>
-            </p:spPr>
-            <p:style>
-              <a:lnRef idx="1">
-                <a:schemeClr val="accent1"/>
-              </a:lnRef>
-              <a:fillRef idx="0">
-                <a:schemeClr val="accent1"/>
-              </a:fillRef>
-              <a:effectRef idx="0">
-                <a:schemeClr val="accent1"/>
-              </a:effectRef>
-              <a:fontRef idx="minor">
-                <a:schemeClr val="tx1"/>
-              </a:fontRef>
-            </p:style>
-          </p:cxnSp>
-          <p:cxnSp>
-            <p:nvCxnSpPr>
-              <p:cNvPr id="23" name="Straight Arrow Connector 22">
-                <a:extLst>
-                  <a:ext uri="{FF2B5EF4-FFF2-40B4-BE49-F238E27FC236}">
-                    <a16:creationId xmlns:a16="http://schemas.microsoft.com/office/drawing/2014/main" id="{F9C2AC7B-CD0E-4ABC-8AF1-323D2F65F3C3}"/>
-                  </a:ext>
-                </a:extLst>
-              </p:cNvPr>
-              <p:cNvCxnSpPr>
-                <a:stCxn id="8" idx="0"/>
-                <a:endCxn id="11" idx="4"/>
-              </p:cNvCxnSpPr>
-              <p:nvPr/>
-            </p:nvCxnSpPr>
-            <p:spPr>
-              <a:xfrm flipH="1" flipV="1">
-                <a:off x="5368800" y="1775718"/>
-                <a:ext cx="1167035" cy="1039199"/>
-              </a:xfrm>
-              <a:prstGeom prst="straightConnector1">
-                <a:avLst/>
-              </a:prstGeom>
-              <a:ln w="12700">
-                <a:solidFill>
-                  <a:schemeClr val="accent6"/>
-                </a:solidFill>
-                <a:prstDash val="lgDash"/>
-                <a:tailEnd type="triangle"/>
-              </a:ln>
-            </p:spPr>
-            <p:style>
-              <a:lnRef idx="1">
-                <a:schemeClr val="accent1"/>
-              </a:lnRef>
-              <a:fillRef idx="0">
-                <a:schemeClr val="accent1"/>
-              </a:fillRef>
-              <a:effectRef idx="0">
-                <a:schemeClr val="accent1"/>
-              </a:effectRef>
-              <a:fontRef idx="minor">
-                <a:schemeClr val="tx1"/>
-              </a:fontRef>
-            </p:style>
-          </p:cxnSp>
-          <p:cxnSp>
-            <p:nvCxnSpPr>
-              <p:cNvPr id="25" name="Straight Arrow Connector 24">
-                <a:extLst>
-                  <a:ext uri="{FF2B5EF4-FFF2-40B4-BE49-F238E27FC236}">
-                    <a16:creationId xmlns:a16="http://schemas.microsoft.com/office/drawing/2014/main" id="{1C78F0D8-F9BE-49B8-9D09-9014CBA0D7FB}"/>
-                  </a:ext>
-                </a:extLst>
-              </p:cNvPr>
-              <p:cNvCxnSpPr>
-                <a:stCxn id="11" idx="6"/>
-                <a:endCxn id="8" idx="7"/>
-              </p:cNvCxnSpPr>
-              <p:nvPr/>
-            </p:nvCxnSpPr>
-            <p:spPr>
-              <a:xfrm>
-                <a:off x="5458800" y="1685718"/>
-                <a:ext cx="1178858" cy="1171376"/>
-              </a:xfrm>
-              <a:prstGeom prst="straightConnector1">
-                <a:avLst/>
-              </a:prstGeom>
-              <a:ln w="12700">
-                <a:solidFill>
-                  <a:schemeClr val="accent6"/>
-                </a:solidFill>
-                <a:prstDash val="lgDash"/>
-                <a:tailEnd type="triangle"/>
-              </a:ln>
-            </p:spPr>
-            <p:style>
-              <a:lnRef idx="1">
-                <a:schemeClr val="accent1"/>
-              </a:lnRef>
-              <a:fillRef idx="0">
-                <a:schemeClr val="accent1"/>
-              </a:fillRef>
-              <a:effectRef idx="0">
-                <a:schemeClr val="accent1"/>
-              </a:effectRef>
-              <a:fontRef idx="minor">
-                <a:schemeClr val="tx1"/>
-              </a:fontRef>
-            </p:style>
-          </p:cxnSp>
-          <p:cxnSp>
-            <p:nvCxnSpPr>
-              <p:cNvPr id="27" name="Straight Arrow Connector 26">
-                <a:extLst>
-                  <a:ext uri="{FF2B5EF4-FFF2-40B4-BE49-F238E27FC236}">
-                    <a16:creationId xmlns:a16="http://schemas.microsoft.com/office/drawing/2014/main" id="{00D2466C-9AF0-43D4-9F07-5DC2DE8C9ACA}"/>
-                  </a:ext>
-                </a:extLst>
-              </p:cNvPr>
-              <p:cNvCxnSpPr>
-                <a:stCxn id="8" idx="6"/>
-                <a:endCxn id="12" idx="1"/>
-              </p:cNvCxnSpPr>
-              <p:nvPr/>
-            </p:nvCxnSpPr>
-            <p:spPr>
-              <a:xfrm>
-                <a:off x="6679835" y="2958917"/>
-                <a:ext cx="669983" cy="531596"/>
-              </a:xfrm>
-              <a:prstGeom prst="straightConnector1">
-                <a:avLst/>
-              </a:prstGeom>
-              <a:ln w="12700">
-                <a:solidFill>
-                  <a:schemeClr val="accent6"/>
-                </a:solidFill>
-                <a:prstDash val="lgDash"/>
-                <a:tailEnd type="triangle"/>
-              </a:ln>
-            </p:spPr>
-            <p:style>
-              <a:lnRef idx="1">
-                <a:schemeClr val="accent1"/>
-              </a:lnRef>
-              <a:fillRef idx="0">
-                <a:schemeClr val="accent1"/>
-              </a:fillRef>
-              <a:effectRef idx="0">
-                <a:schemeClr val="accent1"/>
-              </a:effectRef>
-              <a:fontRef idx="minor">
-                <a:schemeClr val="tx1"/>
-              </a:fontRef>
-            </p:style>
-          </p:cxnSp>
-          <p:cxnSp>
-            <p:nvCxnSpPr>
-              <p:cNvPr id="29" name="Straight Arrow Connector 28">
-                <a:extLst>
-                  <a:ext uri="{FF2B5EF4-FFF2-40B4-BE49-F238E27FC236}">
-                    <a16:creationId xmlns:a16="http://schemas.microsoft.com/office/drawing/2014/main" id="{03611E8D-9734-412B-8E64-36DA7EBEC3F1}"/>
-                  </a:ext>
-                </a:extLst>
-              </p:cNvPr>
-              <p:cNvCxnSpPr>
-                <a:stCxn id="12" idx="2"/>
-                <a:endCxn id="8" idx="5"/>
-              </p:cNvCxnSpPr>
-              <p:nvPr/>
-            </p:nvCxnSpPr>
-            <p:spPr>
-              <a:xfrm flipH="1" flipV="1">
-                <a:off x="6637658" y="3060740"/>
-                <a:ext cx="685800" cy="493413"/>
-              </a:xfrm>
-              <a:prstGeom prst="straightConnector1">
-                <a:avLst/>
-              </a:prstGeom>
-              <a:ln w="12700">
-                <a:solidFill>
-                  <a:schemeClr val="accent6"/>
-                </a:solidFill>
-                <a:prstDash val="lgDash"/>
-                <a:tailEnd type="triangle"/>
-              </a:ln>
-            </p:spPr>
-            <p:style>
-              <a:lnRef idx="1">
-                <a:schemeClr val="accent1"/>
-              </a:lnRef>
-              <a:fillRef idx="0">
-                <a:schemeClr val="accent1"/>
-              </a:fillRef>
-              <a:effectRef idx="0">
-                <a:schemeClr val="accent1"/>
-              </a:effectRef>
-              <a:fontRef idx="minor">
-                <a:schemeClr val="tx1"/>
-              </a:fontRef>
-            </p:style>
-          </p:cxnSp>
-          <p:cxnSp>
-            <p:nvCxnSpPr>
-              <p:cNvPr id="31" name="Straight Arrow Connector 30">
-                <a:extLst>
-                  <a:ext uri="{FF2B5EF4-FFF2-40B4-BE49-F238E27FC236}">
-                    <a16:creationId xmlns:a16="http://schemas.microsoft.com/office/drawing/2014/main" id="{F7E9DC04-D3B5-4C8B-A693-1597AFD3F922}"/>
-                  </a:ext>
-                </a:extLst>
-              </p:cNvPr>
-              <p:cNvCxnSpPr>
-                <a:cxnSpLocks/>
-                <a:stCxn id="8" idx="3"/>
-                <a:endCxn id="7" idx="3"/>
-              </p:cNvCxnSpPr>
-              <p:nvPr/>
-            </p:nvCxnSpPr>
-            <p:spPr>
-              <a:xfrm flipH="1">
-                <a:off x="2976283" y="3060740"/>
-                <a:ext cx="3457729" cy="2049424"/>
-              </a:xfrm>
-              <a:prstGeom prst="straightConnector1">
-                <a:avLst/>
-              </a:prstGeom>
-              <a:ln>
-                <a:solidFill>
-                  <a:schemeClr val="tx1"/>
-                </a:solidFill>
-                <a:tailEnd type="triangle"/>
-              </a:ln>
-            </p:spPr>
-            <p:style>
-              <a:lnRef idx="1">
-                <a:schemeClr val="accent1"/>
-              </a:lnRef>
-              <a:fillRef idx="0">
-                <a:schemeClr val="accent1"/>
-              </a:fillRef>
-              <a:effectRef idx="0">
-                <a:schemeClr val="accent1"/>
-              </a:effectRef>
-              <a:fontRef idx="minor">
-                <a:schemeClr val="tx1"/>
-              </a:fontRef>
-            </p:style>
-          </p:cxnSp>
-          <p:pic>
-            <p:nvPicPr>
-              <p:cNvPr id="50" name="Picture 49" descr="A picture containing logo&#10;&#10;Description automatically generated">
-                <a:extLst>
-                  <a:ext uri="{FF2B5EF4-FFF2-40B4-BE49-F238E27FC236}">
-                    <a16:creationId xmlns:a16="http://schemas.microsoft.com/office/drawing/2014/main" id="{935B4D9C-ACB2-46C8-AD43-A6B739368151}"/>
-                  </a:ext>
-                </a:extLst>
-              </p:cNvPr>
-              <p:cNvPicPr>
-                <a:picLocks noChangeAspect="1"/>
-              </p:cNvPicPr>
-              <p:nvPr/>
-            </p:nvPicPr>
-            <p:blipFill rotWithShape="1">
-              <a:blip r:embed="rId4">
-                <a:extLst>
-                  <a:ext uri="{BEBA8EAE-BF5A-486C-A8C5-ECC9F3942E4B}">
-                    <a14:imgProps xmlns:a14="http://schemas.microsoft.com/office/drawing/2010/main">
-                      <a14:imgLayer r:embed="rId5">
-                        <a14:imgEffect>
-                          <a14:backgroundRemoval t="43375" b="99685" l="26410" r="77717">
-                            <a14:foregroundMark x1="49519" y1="96845" x2="49519" y2="96845"/>
-                            <a14:foregroundMark x1="29023" y1="83281" x2="29023" y2="83281"/>
-                            <a14:foregroundMark x1="30674" y1="79653" x2="30674" y2="79653"/>
-                            <a14:foregroundMark x1="32325" y1="73975" x2="32325" y2="73975"/>
-                            <a14:foregroundMark x1="30949" y1="71609" x2="30674" y2="65773"/>
-                            <a14:foregroundMark x1="30949" y1="62303" x2="32325" y2="51577"/>
-                            <a14:foregroundMark x1="69601" y1="92271" x2="29298" y2="52524"/>
-                            <a14:foregroundMark x1="32050" y1="62303" x2="26685" y2="62303"/>
-                            <a14:foregroundMark x1="38239" y1="83596" x2="28473" y2="93218"/>
-                            <a14:foregroundMark x1="40028" y1="85804" x2="35488" y2="97161"/>
-                            <a14:foregroundMark x1="44154" y1="88801" x2="44154" y2="99369"/>
-                            <a14:foregroundMark x1="50069" y1="92271" x2="58322" y2="98423"/>
-                            <a14:foregroundMark x1="60523" y1="90063" x2="33150" y2="75868"/>
-                            <a14:foregroundMark x1="38239" y1="69401" x2="72902" y2="67508"/>
-                            <a14:foregroundMark x1="77717" y1="58991" x2="37964" y2="90694"/>
-                            <a14:foregroundMark x1="30124" y1="55205" x2="70977" y2="64196"/>
-                            <a14:foregroundMark x1="30674" y1="43533" x2="30674" y2="43533"/>
-                            <a14:foregroundMark x1="28473" y1="44795" x2="29849" y2="48738"/>
-                            <a14:foregroundMark x1="75516" y1="52524" x2="31224" y2="72555"/>
-                            <a14:foregroundMark x1="70702" y1="82334" x2="69051" y2="71609"/>
-                            <a14:foregroundMark x1="77717" y1="72240" x2="46492" y2="99685"/>
-                          </a14:backgroundRemoval>
-                        </a14:imgEffect>
-                      </a14:imgLayer>
-                    </a14:imgProps>
-                  </a:ext>
-                  <a:ext uri="{28A0092B-C50C-407E-A947-70E740481C1C}">
-                    <a14:useLocalDpi xmlns:a14="http://schemas.microsoft.com/office/drawing/2010/main" val="0"/>
-                  </a:ext>
-                </a:extLst>
-              </a:blip>
-              <a:srcRect l="22293" t="39113" r="17938" b="-162"/>
-              <a:stretch/>
-            </p:blipFill>
-            <p:spPr>
-              <a:xfrm>
-                <a:off x="4146875" y="3226170"/>
-                <a:ext cx="323322" cy="288000"/>
-              </a:xfrm>
-              <a:prstGeom prst="rect">
-                <a:avLst/>
-              </a:prstGeom>
-            </p:spPr>
-          </p:pic>
-          <p:pic>
-            <p:nvPicPr>
-              <p:cNvPr id="52" name="Picture 51" descr="Logo&#10;&#10;Description automatically generated">
-                <a:extLst>
-                  <a:ext uri="{FF2B5EF4-FFF2-40B4-BE49-F238E27FC236}">
-                    <a16:creationId xmlns:a16="http://schemas.microsoft.com/office/drawing/2014/main" id="{DDDAECCE-37A2-4512-A20F-89DE158AB76B}"/>
-                  </a:ext>
-                </a:extLst>
-              </p:cNvPr>
-              <p:cNvPicPr>
-                <a:picLocks noChangeAspect="1"/>
-              </p:cNvPicPr>
-              <p:nvPr/>
-            </p:nvPicPr>
-            <p:blipFill rotWithShape="1">
-              <a:blip r:embed="rId6">
-                <a:extLst>
-                  <a:ext uri="{BEBA8EAE-BF5A-486C-A8C5-ECC9F3942E4B}">
-                    <a14:imgProps xmlns:a14="http://schemas.microsoft.com/office/drawing/2010/main">
-                      <a14:imgLayer r:embed="rId7">
-                        <a14:imgEffect>
-                          <a14:backgroundRemoval t="38350" b="98382" l="28099" r="78512">
-                            <a14:foregroundMark x1="30303" y1="76375" x2="30303" y2="76375"/>
-                            <a14:foregroundMark x1="49862" y1="98382" x2="49862" y2="98382"/>
-                            <a14:backgroundMark x1="46143" y1="55987" x2="46143" y2="55987"/>
-                          </a14:backgroundRemoval>
-                        </a14:imgEffect>
-                      </a14:imgLayer>
-                    </a14:imgProps>
-                  </a:ext>
-                  <a:ext uri="{28A0092B-C50C-407E-A947-70E740481C1C}">
-                    <a14:useLocalDpi xmlns:a14="http://schemas.microsoft.com/office/drawing/2010/main" val="0"/>
-                  </a:ext>
-                </a:extLst>
-              </a:blip>
-              <a:srcRect l="21797" t="31522" r="15081"/>
-              <a:stretch/>
-            </p:blipFill>
-            <p:spPr>
-              <a:xfrm>
-                <a:off x="2869200" y="4240591"/>
-                <a:ext cx="311870" cy="288000"/>
-              </a:xfrm>
-              <a:prstGeom prst="rect">
-                <a:avLst/>
-              </a:prstGeom>
-            </p:spPr>
-          </p:pic>
-          <p:sp>
-            <p:nvSpPr>
-              <p:cNvPr id="68" name="Oval 67">
-                <a:extLst>
-                  <a:ext uri="{FF2B5EF4-FFF2-40B4-BE49-F238E27FC236}">
-                    <a16:creationId xmlns:a16="http://schemas.microsoft.com/office/drawing/2014/main" id="{5A010A55-5D6A-43FD-923F-B9D1CB001372}"/>
-                  </a:ext>
-                </a:extLst>
-              </p:cNvPr>
-              <p:cNvSpPr/>
-              <p:nvPr/>
-            </p:nvSpPr>
-            <p:spPr>
-              <a:xfrm>
-                <a:off x="4975554" y="5145178"/>
-                <a:ext cx="180000" cy="180000"/>
-              </a:xfrm>
-              <a:prstGeom prst="ellipse">
-                <a:avLst/>
-              </a:prstGeom>
-              <a:solidFill>
-                <a:srgbClr val="C00000"/>
-              </a:solidFill>
-              <a:ln>
-                <a:solidFill>
-                  <a:srgbClr val="C00000"/>
-                </a:solidFill>
-              </a:ln>
-            </p:spPr>
-            <p:style>
-              <a:lnRef idx="2">
-                <a:schemeClr val="accent1">
-                  <a:shade val="50000"/>
-                </a:schemeClr>
-              </a:lnRef>
-              <a:fillRef idx="1">
-                <a:schemeClr val="accent1"/>
-              </a:fillRef>
-              <a:effectRef idx="0">
-                <a:schemeClr val="accent1"/>
-              </a:effectRef>
-              <a:fontRef idx="minor">
-                <a:schemeClr val="lt1"/>
-              </a:fontRef>
-            </p:style>
-            <p:txBody>
-              <a:bodyPr rtlCol="0" anchor="ctr"/>
-              <a:lstStyle/>
-              <a:p>
-                <a:pPr algn="ctr"/>
-                <a:endParaRPr lang="en-CH"/>
-              </a:p>
-            </p:txBody>
-          </p:sp>
-          <p:cxnSp>
-            <p:nvCxnSpPr>
-              <p:cNvPr id="69" name="Straight Arrow Connector 68">
-                <a:extLst>
-                  <a:ext uri="{FF2B5EF4-FFF2-40B4-BE49-F238E27FC236}">
-                    <a16:creationId xmlns:a16="http://schemas.microsoft.com/office/drawing/2014/main" id="{63632243-EF2C-4F2A-881F-BEEB405C7C3D}"/>
-                  </a:ext>
-                </a:extLst>
-              </p:cNvPr>
-              <p:cNvCxnSpPr>
-                <a:cxnSpLocks/>
-                <a:stCxn id="7" idx="2"/>
-                <a:endCxn id="68" idx="3"/>
-              </p:cNvCxnSpPr>
-              <p:nvPr/>
-            </p:nvCxnSpPr>
-            <p:spPr>
-              <a:xfrm>
-                <a:off x="2904566" y="5182164"/>
-                <a:ext cx="2097348" cy="116654"/>
-              </a:xfrm>
-              <a:prstGeom prst="straightConnector1">
-                <a:avLst/>
-              </a:prstGeom>
-              <a:ln w="19050">
-                <a:prstDash val="sysDot"/>
-                <a:tailEnd type="triangle"/>
-              </a:ln>
-            </p:spPr>
-            <p:style>
-              <a:lnRef idx="1">
-                <a:schemeClr val="accent1"/>
-              </a:lnRef>
-              <a:fillRef idx="0">
-                <a:schemeClr val="accent1"/>
-              </a:fillRef>
-              <a:effectRef idx="0">
-                <a:schemeClr val="accent1"/>
-              </a:effectRef>
-              <a:fontRef idx="minor">
-                <a:schemeClr val="tx1"/>
-              </a:fontRef>
-            </p:style>
-          </p:cxnSp>
-          <p:cxnSp>
-            <p:nvCxnSpPr>
-              <p:cNvPr id="70" name="Straight Arrow Connector 69">
-                <a:extLst>
-                  <a:ext uri="{FF2B5EF4-FFF2-40B4-BE49-F238E27FC236}">
-                    <a16:creationId xmlns:a16="http://schemas.microsoft.com/office/drawing/2014/main" id="{4FE6DD07-24B9-4C1D-930B-5CC51FA3C778}"/>
-                  </a:ext>
-                </a:extLst>
-              </p:cNvPr>
-              <p:cNvCxnSpPr>
-                <a:cxnSpLocks/>
-                <a:stCxn id="68" idx="7"/>
-                <a:endCxn id="8" idx="4"/>
-              </p:cNvCxnSpPr>
-              <p:nvPr/>
-            </p:nvCxnSpPr>
-            <p:spPr>
-              <a:xfrm flipV="1">
-                <a:off x="5129194" y="3102917"/>
-                <a:ext cx="1406641" cy="2068621"/>
-              </a:xfrm>
-              <a:prstGeom prst="straightConnector1">
-                <a:avLst/>
-              </a:prstGeom>
-              <a:ln w="19050">
-                <a:prstDash val="sysDot"/>
-                <a:tailEnd type="triangle"/>
-              </a:ln>
-            </p:spPr>
-            <p:style>
-              <a:lnRef idx="1">
-                <a:schemeClr val="accent1"/>
-              </a:lnRef>
-              <a:fillRef idx="0">
-                <a:schemeClr val="accent1"/>
-              </a:fillRef>
-              <a:effectRef idx="0">
-                <a:schemeClr val="accent1"/>
-              </a:effectRef>
-              <a:fontRef idx="minor">
-                <a:schemeClr val="tx1"/>
-              </a:fontRef>
-            </p:style>
-          </p:cxnSp>
-          <p:cxnSp>
-            <p:nvCxnSpPr>
-              <p:cNvPr id="77" name="Straight Arrow Connector 76">
-                <a:extLst>
-                  <a:ext uri="{FF2B5EF4-FFF2-40B4-BE49-F238E27FC236}">
-                    <a16:creationId xmlns:a16="http://schemas.microsoft.com/office/drawing/2014/main" id="{38A9423B-3AFC-4FD9-B172-20C07A971A3E}"/>
-                  </a:ext>
-                </a:extLst>
-              </p:cNvPr>
-              <p:cNvCxnSpPr>
-                <a:cxnSpLocks/>
-                <a:endCxn id="7" idx="0"/>
-              </p:cNvCxnSpPr>
-              <p:nvPr/>
-            </p:nvCxnSpPr>
-            <p:spPr>
-              <a:xfrm flipH="1">
-                <a:off x="2904566" y="2958070"/>
-                <a:ext cx="3511709" cy="2080094"/>
-              </a:xfrm>
-              <a:prstGeom prst="straightConnector1">
-                <a:avLst/>
-              </a:prstGeom>
-              <a:ln cmpd="sng">
-                <a:solidFill>
-                  <a:schemeClr val="tx1"/>
-                </a:solidFill>
-                <a:tailEnd type="triangle"/>
-              </a:ln>
-            </p:spPr>
-            <p:style>
-              <a:lnRef idx="1">
-                <a:schemeClr val="accent1"/>
-              </a:lnRef>
-              <a:fillRef idx="0">
-                <a:schemeClr val="accent1"/>
-              </a:fillRef>
-              <a:effectRef idx="0">
-                <a:schemeClr val="accent1"/>
-              </a:effectRef>
-              <a:fontRef idx="minor">
-                <a:schemeClr val="tx1"/>
-              </a:fontRef>
-            </p:style>
-          </p:cxnSp>
-          <p:pic>
-            <p:nvPicPr>
-              <p:cNvPr id="109" name="Picture 108" descr="A picture containing logo&#10;&#10;Description automatically generated">
-                <a:extLst>
-                  <a:ext uri="{FF2B5EF4-FFF2-40B4-BE49-F238E27FC236}">
-                    <a16:creationId xmlns:a16="http://schemas.microsoft.com/office/drawing/2014/main" id="{1E6AAE27-85A0-4F36-9465-67E411C37480}"/>
-                  </a:ext>
-                </a:extLst>
-              </p:cNvPr>
-              <p:cNvPicPr>
-                <a:picLocks noChangeAspect="1"/>
-              </p:cNvPicPr>
-              <p:nvPr/>
-            </p:nvPicPr>
-            <p:blipFill rotWithShape="1">
-              <a:blip r:embed="rId4">
-                <a:extLst>
-                  <a:ext uri="{BEBA8EAE-BF5A-486C-A8C5-ECC9F3942E4B}">
-                    <a14:imgProps xmlns:a14="http://schemas.microsoft.com/office/drawing/2010/main">
-                      <a14:imgLayer r:embed="rId5">
-                        <a14:imgEffect>
-                          <a14:backgroundRemoval t="43375" b="99685" l="26410" r="77717">
-                            <a14:foregroundMark x1="49519" y1="96845" x2="49519" y2="96845"/>
-                            <a14:foregroundMark x1="29023" y1="83281" x2="29023" y2="83281"/>
-                            <a14:foregroundMark x1="30674" y1="79653" x2="30674" y2="79653"/>
-                            <a14:foregroundMark x1="32325" y1="73975" x2="32325" y2="73975"/>
-                            <a14:foregroundMark x1="30949" y1="71609" x2="30674" y2="65773"/>
-                            <a14:foregroundMark x1="30949" y1="62303" x2="32325" y2="51577"/>
-                            <a14:foregroundMark x1="69601" y1="92271" x2="29298" y2="52524"/>
-                            <a14:foregroundMark x1="32050" y1="62303" x2="26685" y2="62303"/>
-                            <a14:foregroundMark x1="38239" y1="83596" x2="28473" y2="93218"/>
-                            <a14:foregroundMark x1="40028" y1="85804" x2="35488" y2="97161"/>
-                            <a14:foregroundMark x1="44154" y1="88801" x2="44154" y2="99369"/>
-                            <a14:foregroundMark x1="50069" y1="92271" x2="58322" y2="98423"/>
-                            <a14:foregroundMark x1="60523" y1="90063" x2="33150" y2="75868"/>
-                            <a14:foregroundMark x1="38239" y1="69401" x2="72902" y2="67508"/>
-                            <a14:foregroundMark x1="77717" y1="58991" x2="37964" y2="90694"/>
-                            <a14:foregroundMark x1="30124" y1="55205" x2="70977" y2="64196"/>
-                            <a14:foregroundMark x1="30674" y1="43533" x2="30674" y2="43533"/>
-                            <a14:foregroundMark x1="28473" y1="44795" x2="29849" y2="48738"/>
-                            <a14:foregroundMark x1="75516" y1="52524" x2="31224" y2="72555"/>
-                            <a14:foregroundMark x1="70702" y1="82334" x2="69051" y2="71609"/>
-                            <a14:foregroundMark x1="77717" y1="72240" x2="46492" y2="99685"/>
-                          </a14:backgroundRemoval>
-                        </a14:imgEffect>
-                      </a14:imgLayer>
-                    </a14:imgProps>
-                  </a:ext>
-                  <a:ext uri="{28A0092B-C50C-407E-A947-70E740481C1C}">
-                    <a14:useLocalDpi xmlns:a14="http://schemas.microsoft.com/office/drawing/2010/main" val="0"/>
-                  </a:ext>
-                </a:extLst>
-              </a:blip>
-              <a:srcRect l="22293" t="39113" r="17938" b="-162"/>
-              <a:stretch/>
-            </p:blipFill>
-            <p:spPr>
-              <a:xfrm>
-                <a:off x="5521689" y="4207031"/>
-                <a:ext cx="323322" cy="288000"/>
-              </a:xfrm>
-              <a:prstGeom prst="rect">
-                <a:avLst/>
-              </a:prstGeom>
-            </p:spPr>
-          </p:pic>
-          <p:pic>
-            <p:nvPicPr>
-              <p:cNvPr id="110" name="Picture 109" descr="Logo&#10;&#10;Description automatically generated">
-                <a:extLst>
-                  <a:ext uri="{FF2B5EF4-FFF2-40B4-BE49-F238E27FC236}">
-                    <a16:creationId xmlns:a16="http://schemas.microsoft.com/office/drawing/2014/main" id="{16841D3B-98BD-4540-BBA7-4F99261BE2E5}"/>
-                  </a:ext>
-                </a:extLst>
-              </p:cNvPr>
-              <p:cNvPicPr>
-                <a:picLocks noChangeAspect="1"/>
-              </p:cNvPicPr>
-              <p:nvPr/>
-            </p:nvPicPr>
-            <p:blipFill rotWithShape="1">
-              <a:blip r:embed="rId6">
-                <a:extLst>
-                  <a:ext uri="{BEBA8EAE-BF5A-486C-A8C5-ECC9F3942E4B}">
-                    <a14:imgProps xmlns:a14="http://schemas.microsoft.com/office/drawing/2010/main">
-                      <a14:imgLayer r:embed="rId7">
-                        <a14:imgEffect>
-                          <a14:backgroundRemoval t="38350" b="98382" l="28099" r="78512">
-                            <a14:foregroundMark x1="30303" y1="76375" x2="30303" y2="76375"/>
-                            <a14:foregroundMark x1="49862" y1="98382" x2="49862" y2="98382"/>
-                            <a14:backgroundMark x1="46143" y1="55987" x2="46143" y2="55987"/>
-                          </a14:backgroundRemoval>
-                        </a14:imgEffect>
-                      </a14:imgLayer>
-                    </a14:imgProps>
-                  </a:ext>
-                  <a:ext uri="{28A0092B-C50C-407E-A947-70E740481C1C}">
-                    <a14:useLocalDpi xmlns:a14="http://schemas.microsoft.com/office/drawing/2010/main" val="0"/>
-                  </a:ext>
-                </a:extLst>
-              </a:blip>
-              <a:srcRect l="21797" t="31522" r="15081"/>
-              <a:stretch/>
-            </p:blipFill>
-            <p:spPr>
-              <a:xfrm>
-                <a:off x="4131728" y="4931150"/>
-                <a:ext cx="311870" cy="288000"/>
-              </a:xfrm>
-              <a:prstGeom prst="rect">
-                <a:avLst/>
-              </a:prstGeom>
-            </p:spPr>
-          </p:pic>
-          <p:pic>
-            <p:nvPicPr>
-              <p:cNvPr id="111" name="Picture 110" descr="Logo&#10;&#10;Description automatically generated">
-                <a:extLst>
-                  <a:ext uri="{FF2B5EF4-FFF2-40B4-BE49-F238E27FC236}">
-                    <a16:creationId xmlns:a16="http://schemas.microsoft.com/office/drawing/2014/main" id="{AD38BDBB-61E8-471A-ACB7-8F306E9748AC}"/>
-                  </a:ext>
-                </a:extLst>
-              </p:cNvPr>
-              <p:cNvPicPr>
-                <a:picLocks noChangeAspect="1"/>
-              </p:cNvPicPr>
-              <p:nvPr/>
-            </p:nvPicPr>
-            <p:blipFill rotWithShape="1">
-              <a:blip r:embed="rId6">
-                <a:extLst>
-                  <a:ext uri="{BEBA8EAE-BF5A-486C-A8C5-ECC9F3942E4B}">
-                    <a14:imgProps xmlns:a14="http://schemas.microsoft.com/office/drawing/2010/main">
-                      <a14:imgLayer r:embed="rId7">
-                        <a14:imgEffect>
-                          <a14:backgroundRemoval t="38350" b="98382" l="28099" r="78512">
-                            <a14:foregroundMark x1="30303" y1="76375" x2="30303" y2="76375"/>
-                            <a14:foregroundMark x1="49862" y1="98382" x2="49862" y2="98382"/>
-                            <a14:backgroundMark x1="46143" y1="55987" x2="46143" y2="55987"/>
-                          </a14:backgroundRemoval>
-                        </a14:imgEffect>
-                      </a14:imgLayer>
-                    </a14:imgProps>
-                  </a:ext>
-                  <a:ext uri="{28A0092B-C50C-407E-A947-70E740481C1C}">
-                    <a14:useLocalDpi xmlns:a14="http://schemas.microsoft.com/office/drawing/2010/main" val="0"/>
-                  </a:ext>
-                </a:extLst>
-              </a:blip>
-              <a:srcRect l="21797" t="31522" r="15081"/>
-              <a:stretch/>
-            </p:blipFill>
-            <p:spPr>
-              <a:xfrm>
-                <a:off x="3917184" y="2650801"/>
-                <a:ext cx="311870" cy="288000"/>
-              </a:xfrm>
-              <a:prstGeom prst="rect">
-                <a:avLst/>
-              </a:prstGeom>
-            </p:spPr>
-          </p:pic>
-          <p:pic>
-            <p:nvPicPr>
-              <p:cNvPr id="113" name="Picture 112" descr="Logo&#10;&#10;Description automatically generated">
-                <a:extLst>
-                  <a:ext uri="{FF2B5EF4-FFF2-40B4-BE49-F238E27FC236}">
-                    <a16:creationId xmlns:a16="http://schemas.microsoft.com/office/drawing/2014/main" id="{11F9AF05-22F8-4328-ABE8-B461F7FF48A3}"/>
-                  </a:ext>
-                </a:extLst>
-              </p:cNvPr>
-              <p:cNvPicPr>
-                <a:picLocks noChangeAspect="1"/>
-              </p:cNvPicPr>
-              <p:nvPr/>
-            </p:nvPicPr>
-            <p:blipFill rotWithShape="1">
-              <a:blip r:embed="rId6">
-                <a:extLst>
-                  <a:ext uri="{BEBA8EAE-BF5A-486C-A8C5-ECC9F3942E4B}">
-                    <a14:imgProps xmlns:a14="http://schemas.microsoft.com/office/drawing/2010/main">
-                      <a14:imgLayer r:embed="rId7">
-                        <a14:imgEffect>
-                          <a14:backgroundRemoval t="38350" b="98382" l="28099" r="78512">
-                            <a14:foregroundMark x1="30303" y1="76375" x2="30303" y2="76375"/>
-                            <a14:foregroundMark x1="49862" y1="98382" x2="49862" y2="98382"/>
-                            <a14:backgroundMark x1="46143" y1="55987" x2="46143" y2="55987"/>
-                          </a14:backgroundRemoval>
-                        </a14:imgEffect>
-                      </a14:imgLayer>
-                    </a14:imgProps>
-                  </a:ext>
-                  <a:ext uri="{28A0092B-C50C-407E-A947-70E740481C1C}">
-                    <a14:useLocalDpi xmlns:a14="http://schemas.microsoft.com/office/drawing/2010/main" val="0"/>
-                  </a:ext>
-                </a:extLst>
-              </a:blip>
-              <a:srcRect l="21797" t="31522" r="15081"/>
-              <a:stretch/>
-            </p:blipFill>
-            <p:spPr>
-              <a:xfrm>
-                <a:off x="5416623" y="2077432"/>
-                <a:ext cx="311870" cy="288000"/>
-              </a:xfrm>
-              <a:prstGeom prst="rect">
-                <a:avLst/>
-              </a:prstGeom>
-            </p:spPr>
-          </p:pic>
-          <p:pic>
-            <p:nvPicPr>
-              <p:cNvPr id="114" name="Picture 113" descr="Logo&#10;&#10;Description automatically generated">
-                <a:extLst>
-                  <a:ext uri="{FF2B5EF4-FFF2-40B4-BE49-F238E27FC236}">
-                    <a16:creationId xmlns:a16="http://schemas.microsoft.com/office/drawing/2014/main" id="{4BDF1E00-0D58-4698-981F-AC9D53C7A171}"/>
-                  </a:ext>
-                </a:extLst>
-              </p:cNvPr>
-              <p:cNvPicPr>
-                <a:picLocks noChangeAspect="1"/>
-              </p:cNvPicPr>
-              <p:nvPr/>
-            </p:nvPicPr>
-            <p:blipFill rotWithShape="1">
-              <a:blip r:embed="rId6">
-                <a:extLst>
-                  <a:ext uri="{BEBA8EAE-BF5A-486C-A8C5-ECC9F3942E4B}">
-                    <a14:imgProps xmlns:a14="http://schemas.microsoft.com/office/drawing/2010/main">
-                      <a14:imgLayer r:embed="rId7">
-                        <a14:imgEffect>
-                          <a14:backgroundRemoval t="38350" b="98382" l="28099" r="78512">
-                            <a14:foregroundMark x1="30303" y1="76375" x2="30303" y2="76375"/>
-                            <a14:foregroundMark x1="49862" y1="98382" x2="49862" y2="98382"/>
-                            <a14:backgroundMark x1="46143" y1="55987" x2="46143" y2="55987"/>
-                          </a14:backgroundRemoval>
-                        </a14:imgEffect>
-                      </a14:imgLayer>
-                    </a14:imgProps>
-                  </a:ext>
-                  <a:ext uri="{28A0092B-C50C-407E-A947-70E740481C1C}">
-                    <a14:useLocalDpi xmlns:a14="http://schemas.microsoft.com/office/drawing/2010/main" val="0"/>
-                  </a:ext>
-                </a:extLst>
-              </a:blip>
-              <a:srcRect l="21797" t="31522" r="15081"/>
-              <a:stretch/>
-            </p:blipFill>
-            <p:spPr>
-              <a:xfrm>
-                <a:off x="6988672" y="2932362"/>
-                <a:ext cx="311870" cy="288000"/>
-              </a:xfrm>
-              <a:prstGeom prst="rect">
-                <a:avLst/>
-              </a:prstGeom>
-            </p:spPr>
-          </p:pic>
-          <p:pic>
-            <p:nvPicPr>
-              <p:cNvPr id="115" name="Picture 114" descr="Logo&#10;&#10;Description automatically generated">
-                <a:extLst>
-                  <a:ext uri="{FF2B5EF4-FFF2-40B4-BE49-F238E27FC236}">
-                    <a16:creationId xmlns:a16="http://schemas.microsoft.com/office/drawing/2014/main" id="{C1D0DF6D-CD98-43A6-A530-CB3F2519AB9B}"/>
-                  </a:ext>
-                </a:extLst>
-              </p:cNvPr>
-              <p:cNvPicPr>
-                <a:picLocks noChangeAspect="1"/>
-              </p:cNvPicPr>
-              <p:nvPr/>
-            </p:nvPicPr>
-            <p:blipFill rotWithShape="1">
-              <a:blip r:embed="rId6">
-                <a:extLst>
-                  <a:ext uri="{BEBA8EAE-BF5A-486C-A8C5-ECC9F3942E4B}">
-                    <a14:imgProps xmlns:a14="http://schemas.microsoft.com/office/drawing/2010/main">
-                      <a14:imgLayer r:embed="rId7">
-                        <a14:imgEffect>
-                          <a14:backgroundRemoval t="38350" b="98382" l="28099" r="78512">
-                            <a14:foregroundMark x1="30303" y1="76375" x2="30303" y2="76375"/>
-                            <a14:foregroundMark x1="49862" y1="98382" x2="49862" y2="98382"/>
-                            <a14:backgroundMark x1="46143" y1="55987" x2="46143" y2="55987"/>
-                          </a14:backgroundRemoval>
-                        </a14:imgEffect>
-                      </a14:imgLayer>
-                    </a14:imgProps>
-                  </a:ext>
-                  <a:ext uri="{28A0092B-C50C-407E-A947-70E740481C1C}">
-                    <a14:useLocalDpi xmlns:a14="http://schemas.microsoft.com/office/drawing/2010/main" val="0"/>
-                  </a:ext>
-                </a:extLst>
-              </a:blip>
-              <a:srcRect l="21797" t="31522" r="15081"/>
-              <a:stretch/>
-            </p:blipFill>
-            <p:spPr>
-              <a:xfrm>
-                <a:off x="4474526" y="4212151"/>
-                <a:ext cx="311870" cy="288000"/>
-              </a:xfrm>
-              <a:prstGeom prst="rect">
-                <a:avLst/>
-              </a:prstGeom>
-            </p:spPr>
-          </p:pic>
-          <p:pic>
-            <p:nvPicPr>
-              <p:cNvPr id="116" name="Picture 115" descr="Logo&#10;&#10;Description automatically generated">
-                <a:extLst>
-                  <a:ext uri="{FF2B5EF4-FFF2-40B4-BE49-F238E27FC236}">
-                    <a16:creationId xmlns:a16="http://schemas.microsoft.com/office/drawing/2014/main" id="{9AF00424-80A7-421D-B882-5A6C6EF38A1A}"/>
-                  </a:ext>
-                </a:extLst>
-              </p:cNvPr>
-              <p:cNvPicPr>
-                <a:picLocks noChangeAspect="1"/>
-              </p:cNvPicPr>
-              <p:nvPr/>
-            </p:nvPicPr>
-            <p:blipFill rotWithShape="1">
-              <a:blip r:embed="rId6">
-                <a:extLst>
-                  <a:ext uri="{BEBA8EAE-BF5A-486C-A8C5-ECC9F3942E4B}">
-                    <a14:imgProps xmlns:a14="http://schemas.microsoft.com/office/drawing/2010/main">
-                      <a14:imgLayer r:embed="rId7">
-                        <a14:imgEffect>
-                          <a14:backgroundRemoval t="38350" b="98382" l="28099" r="78512">
-                            <a14:foregroundMark x1="30303" y1="76375" x2="30303" y2="76375"/>
-                            <a14:foregroundMark x1="49862" y1="98382" x2="49862" y2="98382"/>
-                            <a14:backgroundMark x1="46143" y1="55987" x2="46143" y2="55987"/>
-                          </a14:backgroundRemoval>
-                        </a14:imgEffect>
-                      </a14:imgLayer>
-                    </a14:imgProps>
-                  </a:ext>
-                  <a:ext uri="{28A0092B-C50C-407E-A947-70E740481C1C}">
-                    <a14:useLocalDpi xmlns:a14="http://schemas.microsoft.com/office/drawing/2010/main" val="0"/>
-                  </a:ext>
-                </a:extLst>
-              </a:blip>
-              <a:srcRect l="21797" t="31522" r="15081"/>
-              <a:stretch/>
-            </p:blipFill>
-            <p:spPr>
-              <a:xfrm>
-                <a:off x="3987552" y="3937461"/>
-                <a:ext cx="311870" cy="288000"/>
-              </a:xfrm>
-              <a:prstGeom prst="rect">
-                <a:avLst/>
-              </a:prstGeom>
-            </p:spPr>
-          </p:pic>
-          <p:pic>
-            <p:nvPicPr>
-              <p:cNvPr id="117" name="Picture 116" descr="A picture containing logo&#10;&#10;Description automatically generated">
-                <a:extLst>
-                  <a:ext uri="{FF2B5EF4-FFF2-40B4-BE49-F238E27FC236}">
-                    <a16:creationId xmlns:a16="http://schemas.microsoft.com/office/drawing/2014/main" id="{DE9E136B-0E4D-4D30-A401-846EAA7950C4}"/>
-                  </a:ext>
-                </a:extLst>
-              </p:cNvPr>
-              <p:cNvPicPr>
-                <a:picLocks noChangeAspect="1"/>
-              </p:cNvPicPr>
-              <p:nvPr/>
-            </p:nvPicPr>
-            <p:blipFill rotWithShape="1">
-              <a:blip r:embed="rId4">
-                <a:extLst>
-                  <a:ext uri="{BEBA8EAE-BF5A-486C-A8C5-ECC9F3942E4B}">
-                    <a14:imgProps xmlns:a14="http://schemas.microsoft.com/office/drawing/2010/main">
-                      <a14:imgLayer r:embed="rId5">
-                        <a14:imgEffect>
-                          <a14:backgroundRemoval t="43375" b="99685" l="26410" r="77717">
-                            <a14:foregroundMark x1="49519" y1="96845" x2="49519" y2="96845"/>
-                            <a14:foregroundMark x1="29023" y1="83281" x2="29023" y2="83281"/>
-                            <a14:foregroundMark x1="30674" y1="79653" x2="30674" y2="79653"/>
-                            <a14:foregroundMark x1="32325" y1="73975" x2="32325" y2="73975"/>
-                            <a14:foregroundMark x1="30949" y1="71609" x2="30674" y2="65773"/>
-                            <a14:foregroundMark x1="30949" y1="62303" x2="32325" y2="51577"/>
-                            <a14:foregroundMark x1="69601" y1="92271" x2="29298" y2="52524"/>
-                            <a14:foregroundMark x1="32050" y1="62303" x2="26685" y2="62303"/>
-                            <a14:foregroundMark x1="38239" y1="83596" x2="28473" y2="93218"/>
-                            <a14:foregroundMark x1="40028" y1="85804" x2="35488" y2="97161"/>
-                            <a14:foregroundMark x1="44154" y1="88801" x2="44154" y2="99369"/>
-                            <a14:foregroundMark x1="50069" y1="92271" x2="58322" y2="98423"/>
-                            <a14:foregroundMark x1="60523" y1="90063" x2="33150" y2="75868"/>
-                            <a14:foregroundMark x1="38239" y1="69401" x2="72902" y2="67508"/>
-                            <a14:foregroundMark x1="77717" y1="58991" x2="37964" y2="90694"/>
-                            <a14:foregroundMark x1="30124" y1="55205" x2="70977" y2="64196"/>
-                            <a14:foregroundMark x1="30674" y1="43533" x2="30674" y2="43533"/>
-                            <a14:foregroundMark x1="28473" y1="44795" x2="29849" y2="48738"/>
-                            <a14:foregroundMark x1="75516" y1="52524" x2="31224" y2="72555"/>
-                            <a14:foregroundMark x1="70702" y1="82334" x2="69051" y2="71609"/>
-                            <a14:foregroundMark x1="77717" y1="72240" x2="46492" y2="99685"/>
-                          </a14:backgroundRemoval>
-                        </a14:imgEffect>
-                      </a14:imgLayer>
-                    </a14:imgProps>
-                  </a:ext>
-                  <a:ext uri="{28A0092B-C50C-407E-A947-70E740481C1C}">
-                    <a14:useLocalDpi xmlns:a14="http://schemas.microsoft.com/office/drawing/2010/main" val="0"/>
-                  </a:ext>
-                </a:extLst>
-              </a:blip>
-              <a:srcRect l="22293" t="39113" r="17938" b="-162"/>
-              <a:stretch/>
-            </p:blipFill>
-            <p:spPr>
-              <a:xfrm>
-                <a:off x="4430605" y="2266525"/>
-                <a:ext cx="323322" cy="288000"/>
-              </a:xfrm>
-              <a:prstGeom prst="rect">
-                <a:avLst/>
-              </a:prstGeom>
-            </p:spPr>
-          </p:pic>
-          <p:pic>
-            <p:nvPicPr>
-              <p:cNvPr id="118" name="Picture 117" descr="A picture containing logo&#10;&#10;Description automatically generated">
-                <a:extLst>
-                  <a:ext uri="{FF2B5EF4-FFF2-40B4-BE49-F238E27FC236}">
-                    <a16:creationId xmlns:a16="http://schemas.microsoft.com/office/drawing/2014/main" id="{8D86294D-45F3-46D1-957B-CD39658C4A82}"/>
-                  </a:ext>
-                </a:extLst>
-              </p:cNvPr>
-              <p:cNvPicPr>
-                <a:picLocks noChangeAspect="1"/>
-              </p:cNvPicPr>
-              <p:nvPr/>
-            </p:nvPicPr>
-            <p:blipFill rotWithShape="1">
-              <a:blip r:embed="rId4">
-                <a:extLst>
-                  <a:ext uri="{BEBA8EAE-BF5A-486C-A8C5-ECC9F3942E4B}">
-                    <a14:imgProps xmlns:a14="http://schemas.microsoft.com/office/drawing/2010/main">
-                      <a14:imgLayer r:embed="rId5">
-                        <a14:imgEffect>
-                          <a14:backgroundRemoval t="43375" b="99685" l="26410" r="77717">
-                            <a14:foregroundMark x1="49519" y1="96845" x2="49519" y2="96845"/>
-                            <a14:foregroundMark x1="29023" y1="83281" x2="29023" y2="83281"/>
-                            <a14:foregroundMark x1="30674" y1="79653" x2="30674" y2="79653"/>
-                            <a14:foregroundMark x1="32325" y1="73975" x2="32325" y2="73975"/>
-                            <a14:foregroundMark x1="30949" y1="71609" x2="30674" y2="65773"/>
-                            <a14:foregroundMark x1="30949" y1="62303" x2="32325" y2="51577"/>
-                            <a14:foregroundMark x1="69601" y1="92271" x2="29298" y2="52524"/>
-                            <a14:foregroundMark x1="32050" y1="62303" x2="26685" y2="62303"/>
-                            <a14:foregroundMark x1="38239" y1="83596" x2="28473" y2="93218"/>
-                            <a14:foregroundMark x1="40028" y1="85804" x2="35488" y2="97161"/>
-                            <a14:foregroundMark x1="44154" y1="88801" x2="44154" y2="99369"/>
-                            <a14:foregroundMark x1="50069" y1="92271" x2="58322" y2="98423"/>
-                            <a14:foregroundMark x1="60523" y1="90063" x2="33150" y2="75868"/>
-                            <a14:foregroundMark x1="38239" y1="69401" x2="72902" y2="67508"/>
-                            <a14:foregroundMark x1="77717" y1="58991" x2="37964" y2="90694"/>
-                            <a14:foregroundMark x1="30124" y1="55205" x2="70977" y2="64196"/>
-                            <a14:foregroundMark x1="30674" y1="43533" x2="30674" y2="43533"/>
-                            <a14:foregroundMark x1="28473" y1="44795" x2="29849" y2="48738"/>
-                            <a14:foregroundMark x1="75516" y1="52524" x2="31224" y2="72555"/>
-                            <a14:foregroundMark x1="70702" y1="82334" x2="69051" y2="71609"/>
-                            <a14:foregroundMark x1="77717" y1="72240" x2="46492" y2="99685"/>
-                          </a14:backgroundRemoval>
-                        </a14:imgEffect>
-                      </a14:imgLayer>
-                    </a14:imgProps>
-                  </a:ext>
-                  <a:ext uri="{28A0092B-C50C-407E-A947-70E740481C1C}">
-                    <a14:useLocalDpi xmlns:a14="http://schemas.microsoft.com/office/drawing/2010/main" val="0"/>
-                  </a:ext>
-                </a:extLst>
-              </a:blip>
-              <a:srcRect l="22293" t="39113" r="17938" b="-162"/>
-              <a:stretch/>
-            </p:blipFill>
-            <p:spPr>
-              <a:xfrm>
-                <a:off x="5908493" y="1864102"/>
-                <a:ext cx="323322" cy="288000"/>
-              </a:xfrm>
-              <a:prstGeom prst="rect">
-                <a:avLst/>
-              </a:prstGeom>
-            </p:spPr>
-          </p:pic>
-          <p:pic>
-            <p:nvPicPr>
-              <p:cNvPr id="119" name="Picture 118" descr="A picture containing logo&#10;&#10;Description automatically generated">
-                <a:extLst>
-                  <a:ext uri="{FF2B5EF4-FFF2-40B4-BE49-F238E27FC236}">
-                    <a16:creationId xmlns:a16="http://schemas.microsoft.com/office/drawing/2014/main" id="{767E17AF-F75B-4EE8-A7F8-102300547414}"/>
-                  </a:ext>
-                </a:extLst>
-              </p:cNvPr>
-              <p:cNvPicPr>
-                <a:picLocks noChangeAspect="1"/>
-              </p:cNvPicPr>
-              <p:nvPr/>
-            </p:nvPicPr>
-            <p:blipFill rotWithShape="1">
-              <a:blip r:embed="rId4">
-                <a:extLst>
-                  <a:ext uri="{BEBA8EAE-BF5A-486C-A8C5-ECC9F3942E4B}">
-                    <a14:imgProps xmlns:a14="http://schemas.microsoft.com/office/drawing/2010/main">
-                      <a14:imgLayer r:embed="rId5">
-                        <a14:imgEffect>
-                          <a14:backgroundRemoval t="43375" b="99685" l="26410" r="77717">
-                            <a14:foregroundMark x1="49519" y1="96845" x2="49519" y2="96845"/>
-                            <a14:foregroundMark x1="29023" y1="83281" x2="29023" y2="83281"/>
-                            <a14:foregroundMark x1="30674" y1="79653" x2="30674" y2="79653"/>
-                            <a14:foregroundMark x1="32325" y1="73975" x2="32325" y2="73975"/>
-                            <a14:foregroundMark x1="30949" y1="71609" x2="30674" y2="65773"/>
-                            <a14:foregroundMark x1="30949" y1="62303" x2="32325" y2="51577"/>
-                            <a14:foregroundMark x1="69601" y1="92271" x2="29298" y2="52524"/>
-                            <a14:foregroundMark x1="32050" y1="62303" x2="26685" y2="62303"/>
-                            <a14:foregroundMark x1="38239" y1="83596" x2="28473" y2="93218"/>
-                            <a14:foregroundMark x1="40028" y1="85804" x2="35488" y2="97161"/>
-                            <a14:foregroundMark x1="44154" y1="88801" x2="44154" y2="99369"/>
-                            <a14:foregroundMark x1="50069" y1="92271" x2="58322" y2="98423"/>
-                            <a14:foregroundMark x1="60523" y1="90063" x2="33150" y2="75868"/>
-                            <a14:foregroundMark x1="38239" y1="69401" x2="72902" y2="67508"/>
-                            <a14:foregroundMark x1="77717" y1="58991" x2="37964" y2="90694"/>
-                            <a14:foregroundMark x1="30124" y1="55205" x2="70977" y2="64196"/>
-                            <a14:foregroundMark x1="30674" y1="43533" x2="30674" y2="43533"/>
-                            <a14:foregroundMark x1="28473" y1="44795" x2="29849" y2="48738"/>
-                            <a14:foregroundMark x1="75516" y1="52524" x2="31224" y2="72555"/>
-                            <a14:foregroundMark x1="70702" y1="82334" x2="69051" y2="71609"/>
-                            <a14:foregroundMark x1="77717" y1="72240" x2="46492" y2="99685"/>
-                          </a14:backgroundRemoval>
-                        </a14:imgEffect>
-                      </a14:imgLayer>
-                    </a14:imgProps>
-                  </a:ext>
-                  <a:ext uri="{28A0092B-C50C-407E-A947-70E740481C1C}">
-                    <a14:useLocalDpi xmlns:a14="http://schemas.microsoft.com/office/drawing/2010/main" val="0"/>
-                  </a:ext>
-                </a:extLst>
-              </a:blip>
-              <a:srcRect l="22293" t="39113" r="17938" b="-162"/>
-              <a:stretch/>
-            </p:blipFill>
-            <p:spPr>
-              <a:xfrm>
-                <a:off x="6767985" y="3412089"/>
-                <a:ext cx="323322" cy="288000"/>
-              </a:xfrm>
-              <a:prstGeom prst="rect">
-                <a:avLst/>
-              </a:prstGeom>
-            </p:spPr>
-          </p:pic>
-        </p:grpSp>
+            <a:prstGeom prst="rect">
+              <a:avLst/>
+            </a:prstGeom>
+          </p:spPr>
+        </p:pic>
         <p:sp>
           <p:nvSpPr>
-            <p:cNvPr id="123" name="Rectangle 122">
+            <p:cNvPr id="132" name="Rectangle 131">
               <a:extLst>
                 <a:ext uri="{FF2B5EF4-FFF2-40B4-BE49-F238E27FC236}">
-                  <a16:creationId xmlns:a16="http://schemas.microsoft.com/office/drawing/2014/main" id="{0960F345-6E22-404F-BD22-D09B3FBD0339}"/>
+                  <a16:creationId xmlns:a16="http://schemas.microsoft.com/office/drawing/2014/main" id="{EDA1DD0E-EE5B-4B76-8228-32804BD8DDF2}"/>
                 </a:ext>
               </a:extLst>
             </p:cNvPr>
@@ -5514,8 +3954,8 @@
           </p:nvSpPr>
           <p:spPr>
             <a:xfrm>
-              <a:off x="3678446" y="4207269"/>
-              <a:ext cx="5363953" cy="2282158"/>
+              <a:off x="7183120" y="4443830"/>
+              <a:ext cx="4104640" cy="2332890"/>
             </a:xfrm>
             <a:prstGeom prst="rect">
               <a:avLst/>
@@ -5621,10 +4061,10 @@
       </p:pic>
       <p:pic>
         <p:nvPicPr>
-          <p:cNvPr id="7" name="Picture 6" descr="Shape, arrow&#10;&#10;Description automatically generated">
-            <a:extLst>
-              <a:ext uri="{FF2B5EF4-FFF2-40B4-BE49-F238E27FC236}">
-                <a16:creationId xmlns:a16="http://schemas.microsoft.com/office/drawing/2014/main" id="{09AB0E17-48C0-4311-A041-BE3656DE035D}"/>
+          <p:cNvPr id="9" name="Picture 8" descr="Shape, arrow&#10;&#10;Description automatically generated">
+            <a:extLst>
+              <a:ext uri="{FF2B5EF4-FFF2-40B4-BE49-F238E27FC236}">
+                <a16:creationId xmlns:a16="http://schemas.microsoft.com/office/drawing/2014/main" id="{AB0842D2-D76C-4196-9EF3-E9A95B347621}"/>
               </a:ext>
             </a:extLst>
           </p:cNvPr>
@@ -5647,7 +4087,7 @@
         </p:blipFill>
         <p:spPr>
           <a:xfrm>
-            <a:off x="6269617" y="197166"/>
+            <a:off x="6163916" y="177769"/>
             <a:ext cx="5403325" cy="6339902"/>
           </a:xfrm>
           <a:prstGeom prst="rect">

</xml_diff>